<commit_message>
Update BattleshipModel class diagram
Update class diagram.
</commit_message>
<xml_diff>
--- a/docs/diagrams/BattleshipModelDiagram.pptx
+++ b/docs/diagrams/BattleshipModelDiagram.pptx
@@ -126,12 +126,33 @@
 </p:presentation>
 </file>
 
-<file path=ppt/revisionInfo.xml><?xml version="1.0" encoding="utf-8"?>
-<p1510:revInfo xmlns:a="http://schemas.openxmlformats.org/drawingml/2006/main" xmlns:r="http://schemas.openxmlformats.org/officeDocument/2006/relationships" xmlns:p1510="http://schemas.microsoft.com/office/powerpoint/2015/10/main">
-  <p1510:revLst>
-    <p1510:client id="{91585DDA-80D1-2A41-BA8C-034FE7E6CF66}" v="70" dt="2019-04-02T07:41:25.407"/>
-  </p1510:revLst>
-</p1510:revInfo>
+<file path=ppt/changesInfos/changesInfo1.xml><?xml version="1.0" encoding="utf-8"?>
+<pc:chgInfo xmlns:a="http://schemas.openxmlformats.org/drawingml/2006/main" xmlns:r="http://schemas.openxmlformats.org/officeDocument/2006/relationships" xmlns:ac="http://schemas.microsoft.com/office/drawing/2013/main/command" xmlns:pc="http://schemas.microsoft.com/office/powerpoint/2013/main/command">
+  <pc:docChgLst>
+    <pc:chgData name="Ian Wu Ling En" userId="28715549-2f5c-46f8-b7f8-f39c35f3312d" providerId="ADAL" clId="{1981E527-88DB-4B42-B600-179989FE8E1C}"/>
+    <pc:docChg chg="undo modSld">
+      <pc:chgData name="Ian Wu Ling En" userId="28715549-2f5c-46f8-b7f8-f39c35f3312d" providerId="ADAL" clId="{1981E527-88DB-4B42-B600-179989FE8E1C}" dt="2019-04-13T04:44:18.784" v="4" actId="1076"/>
+      <pc:docMkLst>
+        <pc:docMk/>
+      </pc:docMkLst>
+      <pc:sldChg chg="modSp">
+        <pc:chgData name="Ian Wu Ling En" userId="28715549-2f5c-46f8-b7f8-f39c35f3312d" providerId="ADAL" clId="{1981E527-88DB-4B42-B600-179989FE8E1C}" dt="2019-04-13T04:44:18.784" v="4" actId="1076"/>
+        <pc:sldMkLst>
+          <pc:docMk/>
+          <pc:sldMk cId="2396968029" sldId="263"/>
+        </pc:sldMkLst>
+        <pc:spChg chg="mod">
+          <ac:chgData name="Ian Wu Ling En" userId="28715549-2f5c-46f8-b7f8-f39c35f3312d" providerId="ADAL" clId="{1981E527-88DB-4B42-B600-179989FE8E1C}" dt="2019-04-13T04:44:18.784" v="4" actId="1076"/>
+          <ac:spMkLst>
+            <pc:docMk/>
+            <pc:sldMk cId="2396968029" sldId="263"/>
+            <ac:spMk id="93" creationId="{50EF617B-95B7-0846-AA13-C01763B16B1A}"/>
+          </ac:spMkLst>
+        </pc:spChg>
+      </pc:sldChg>
+    </pc:docChg>
+  </pc:docChgLst>
+</pc:chgInfo>
 </file>
 
 <file path=ppt/notesMasters/notesMaster1.xml><?xml version="1.0" encoding="utf-8"?>
@@ -216,7 +237,7 @@
           <a:p>
             <a:fld id="{F5CC4B3F-88C1-4FFA-B1B6-F41C21DC6924}" type="datetimeFigureOut">
               <a:rPr lang="en-US" smtClean="0"/>
-              <a:t>4/4/2019</a:t>
+              <a:t>4/13/19</a:t>
             </a:fld>
             <a:endParaRPr lang="en-US"/>
           </a:p>
@@ -662,7 +683,7 @@
           <a:p>
             <a:fld id="{78C97017-6FC3-485B-9764-EAC9E56C1D49}" type="datetimeFigureOut">
               <a:rPr lang="en-US" smtClean="0"/>
-              <a:t>4/4/2019</a:t>
+              <a:t>4/13/19</a:t>
             </a:fld>
             <a:endParaRPr lang="en-US"/>
           </a:p>
@@ -830,7 +851,7 @@
           <a:p>
             <a:fld id="{78C97017-6FC3-485B-9764-EAC9E56C1D49}" type="datetimeFigureOut">
               <a:rPr lang="en-US" smtClean="0"/>
-              <a:t>4/4/2019</a:t>
+              <a:t>4/13/19</a:t>
             </a:fld>
             <a:endParaRPr lang="en-US"/>
           </a:p>
@@ -1008,7 +1029,7 @@
           <a:p>
             <a:fld id="{78C97017-6FC3-485B-9764-EAC9E56C1D49}" type="datetimeFigureOut">
               <a:rPr lang="en-US" smtClean="0"/>
-              <a:t>4/4/2019</a:t>
+              <a:t>4/13/19</a:t>
             </a:fld>
             <a:endParaRPr lang="en-US"/>
           </a:p>
@@ -1176,7 +1197,7 @@
           <a:p>
             <a:fld id="{78C97017-6FC3-485B-9764-EAC9E56C1D49}" type="datetimeFigureOut">
               <a:rPr lang="en-US" smtClean="0"/>
-              <a:t>4/4/2019</a:t>
+              <a:t>4/13/19</a:t>
             </a:fld>
             <a:endParaRPr lang="en-US"/>
           </a:p>
@@ -1421,7 +1442,7 @@
           <a:p>
             <a:fld id="{78C97017-6FC3-485B-9764-EAC9E56C1D49}" type="datetimeFigureOut">
               <a:rPr lang="en-US" smtClean="0"/>
-              <a:t>4/4/2019</a:t>
+              <a:t>4/13/19</a:t>
             </a:fld>
             <a:endParaRPr lang="en-US"/>
           </a:p>
@@ -1706,7 +1727,7 @@
           <a:p>
             <a:fld id="{78C97017-6FC3-485B-9764-EAC9E56C1D49}" type="datetimeFigureOut">
               <a:rPr lang="en-US" smtClean="0"/>
-              <a:t>4/4/2019</a:t>
+              <a:t>4/13/19</a:t>
             </a:fld>
             <a:endParaRPr lang="en-US"/>
           </a:p>
@@ -2125,7 +2146,7 @@
           <a:p>
             <a:fld id="{78C97017-6FC3-485B-9764-EAC9E56C1D49}" type="datetimeFigureOut">
               <a:rPr lang="en-US" smtClean="0"/>
-              <a:t>4/4/2019</a:t>
+              <a:t>4/13/19</a:t>
             </a:fld>
             <a:endParaRPr lang="en-US"/>
           </a:p>
@@ -2242,7 +2263,7 @@
           <a:p>
             <a:fld id="{78C97017-6FC3-485B-9764-EAC9E56C1D49}" type="datetimeFigureOut">
               <a:rPr lang="en-US" smtClean="0"/>
-              <a:t>4/4/2019</a:t>
+              <a:t>4/13/19</a:t>
             </a:fld>
             <a:endParaRPr lang="en-US"/>
           </a:p>
@@ -2337,7 +2358,7 @@
           <a:p>
             <a:fld id="{78C97017-6FC3-485B-9764-EAC9E56C1D49}" type="datetimeFigureOut">
               <a:rPr lang="en-US" smtClean="0"/>
-              <a:t>4/4/2019</a:t>
+              <a:t>4/13/19</a:t>
             </a:fld>
             <a:endParaRPr lang="en-US"/>
           </a:p>
@@ -2612,7 +2633,7 @@
           <a:p>
             <a:fld id="{78C97017-6FC3-485B-9764-EAC9E56C1D49}" type="datetimeFigureOut">
               <a:rPr lang="en-US" smtClean="0"/>
-              <a:t>4/4/2019</a:t>
+              <a:t>4/13/19</a:t>
             </a:fld>
             <a:endParaRPr lang="en-US"/>
           </a:p>
@@ -2864,7 +2885,7 @@
           <a:p>
             <a:fld id="{78C97017-6FC3-485B-9764-EAC9E56C1D49}" type="datetimeFigureOut">
               <a:rPr lang="en-US" smtClean="0"/>
-              <a:t>4/4/2019</a:t>
+              <a:t>4/13/19</a:t>
             </a:fld>
             <a:endParaRPr lang="en-US"/>
           </a:p>
@@ -3075,7 +3096,7 @@
           <a:p>
             <a:fld id="{78C97017-6FC3-485B-9764-EAC9E56C1D49}" type="datetimeFigureOut">
               <a:rPr lang="en-US" smtClean="0"/>
-              <a:t>4/4/2019</a:t>
+              <a:t>4/13/19</a:t>
             </a:fld>
             <a:endParaRPr lang="en-US"/>
           </a:p>
@@ -3464,8 +3485,8 @@
         </p:nvSpPr>
         <p:spPr>
           <a:xfrm>
-            <a:off x="733438" y="334659"/>
-            <a:ext cx="7496162" cy="6142341"/>
+            <a:off x="533400" y="990600"/>
+            <a:ext cx="7496162" cy="5257800"/>
           </a:xfrm>
           <a:prstGeom prst="roundRect">
             <a:avLst>

</xml_diff>